<commit_message>
switch the picture for HDD
</commit_message>
<xml_diff>
--- a/ignite-community.pptx
+++ b/ignite-community.pptx
@@ -4042,9 +4042,56 @@
           </a:p>
         </p:txBody>
       </p:sp>
+      <p:sp>
+        <p:nvSpPr>
+          <p:cNvPr id="4" name="Footer Placeholder 3"/>
+          <p:cNvSpPr>
+            <a:spLocks noGrp="1"/>
+          </p:cNvSpPr>
+          <p:nvPr>
+            <p:ph type="ftr" sz="quarter" idx="11"/>
+          </p:nvPr>
+        </p:nvSpPr>
+        <p:spPr/>
+        <p:txBody>
+          <a:bodyPr/>
+          <a:lstStyle/>
+          <a:p>
+            <a:r>
+              <a:rPr lang="en-US" smtClean="0"/>
+              <a:t>@FoodFightShow</a:t>
+            </a:r>
+            <a:endParaRPr lang="en-US" dirty="0" smtClean="0"/>
+          </a:p>
+        </p:txBody>
+      </p:sp>
+      <p:sp>
+        <p:nvSpPr>
+          <p:cNvPr id="5" name="Slide Number Placeholder 4"/>
+          <p:cNvSpPr>
+            <a:spLocks noGrp="1"/>
+          </p:cNvSpPr>
+          <p:nvPr>
+            <p:ph type="sldNum" sz="quarter" idx="12"/>
+          </p:nvPr>
+        </p:nvSpPr>
+        <p:spPr/>
+        <p:txBody>
+          <a:bodyPr/>
+          <a:lstStyle/>
+          <a:p>
+            <a:fld id="{70AB0261-BE28-3447-975F-A03D340A3B94}" type="slidenum">
+              <a:rPr lang="en-US" smtClean="0"/>
+              <a:pPr/>
+              <a:t>13</a:t>
+            </a:fld>
+            <a:endParaRPr lang="en-US"/>
+          </a:p>
+        </p:txBody>
+      </p:sp>
       <p:pic>
         <p:nvPicPr>
-          <p:cNvPr id="6" name="Content Placeholder 5" descr="lusis.jpg"/>
+          <p:cNvPr id="8" name="Content Placeholder 7" descr="adamhjk_lusis.jpg"/>
           <p:cNvPicPr>
             <a:picLocks noGrp="1" noChangeAspect="1"/>
           </p:cNvPicPr>
@@ -4054,64 +4101,13 @@
         </p:nvPicPr>
         <p:blipFill>
           <a:blip r:embed="rId2"/>
+          <a:srcRect l="-71221" r="-71221"/>
           <a:stretch>
             <a:fillRect/>
           </a:stretch>
         </p:blipFill>
-        <p:spPr>
-          <a:xfrm>
-            <a:off x="1861562" y="1457738"/>
-            <a:ext cx="5957220" cy="4467915"/>
-          </a:xfrm>
-        </p:spPr>
+        <p:spPr/>
       </p:pic>
-      <p:sp>
-        <p:nvSpPr>
-          <p:cNvPr id="4" name="Footer Placeholder 3"/>
-          <p:cNvSpPr>
-            <a:spLocks noGrp="1"/>
-          </p:cNvSpPr>
-          <p:nvPr>
-            <p:ph type="ftr" sz="quarter" idx="11"/>
-          </p:nvPr>
-        </p:nvSpPr>
-        <p:spPr/>
-        <p:txBody>
-          <a:bodyPr/>
-          <a:lstStyle/>
-          <a:p>
-            <a:r>
-              <a:rPr lang="en-US" smtClean="0"/>
-              <a:t>@FoodFightShow</a:t>
-            </a:r>
-            <a:endParaRPr lang="en-US" dirty="0" smtClean="0"/>
-          </a:p>
-        </p:txBody>
-      </p:sp>
-      <p:sp>
-        <p:nvSpPr>
-          <p:cNvPr id="5" name="Slide Number Placeholder 4"/>
-          <p:cNvSpPr>
-            <a:spLocks noGrp="1"/>
-          </p:cNvSpPr>
-          <p:nvPr>
-            <p:ph type="sldNum" sz="quarter" idx="12"/>
-          </p:nvPr>
-        </p:nvSpPr>
-        <p:spPr/>
-        <p:txBody>
-          <a:bodyPr/>
-          <a:lstStyle/>
-          <a:p>
-            <a:fld id="{70AB0261-BE28-3447-975F-A03D340A3B94}" type="slidenum">
-              <a:rPr lang="en-US" smtClean="0"/>
-              <a:pPr/>
-              <a:t>13</a:t>
-            </a:fld>
-            <a:endParaRPr lang="en-US"/>
-          </a:p>
-        </p:txBody>
-      </p:sp>
     </p:spTree>
   </p:cSld>
   <p:clrMapOvr>
@@ -4841,10 +4837,10 @@
           <a:p>
             <a:pPr lvl="1"/>
             <a:r>
-              <a:rPr lang="en-US" smtClean="0"/>
+              <a:rPr lang="en-US" dirty="0" smtClean="0"/>
               <a:t>Add tests!</a:t>
             </a:r>
-            <a:endParaRPr lang="en-US"/>
+            <a:endParaRPr lang="en-US" dirty="0"/>
           </a:p>
         </p:txBody>
       </p:sp>

</xml_diff>

<commit_message>
add ppt and pdf versions of the slides
</commit_message>
<xml_diff>
--- a/ignite-community.pptx
+++ b/ignite-community.pptx
@@ -873,6 +873,7 @@
   <p:clrMapOvr>
     <a:masterClrMapping/>
   </p:clrMapOvr>
+  <p:transition advClick="0" advTm="15000"/>
 </p:sldLayout>
 </file>
 
@@ -1024,6 +1025,7 @@
   <p:clrMapOvr>
     <a:masterClrMapping/>
   </p:clrMapOvr>
+  <p:transition advClick="0" advTm="15000"/>
 </p:sldLayout>
 </file>
 
@@ -1189,6 +1191,7 @@
   <p:clrMapOvr>
     <a:masterClrMapping/>
   </p:clrMapOvr>
+  <p:transition advClick="0" advTm="15000"/>
 </p:sldLayout>
 </file>
 
@@ -1447,6 +1450,7 @@
   <p:clrMapOvr>
     <a:masterClrMapping/>
   </p:clrMapOvr>
+  <p:transition advClick="0" advTm="15000"/>
 </p:sldLayout>
 </file>
 
@@ -1716,6 +1720,7 @@
   <p:clrMapOvr>
     <a:masterClrMapping/>
   </p:clrMapOvr>
+  <p:transition advClick="0" advTm="15000"/>
 </p:sldLayout>
 </file>
 
@@ -2119,6 +2124,7 @@
   <p:clrMapOvr>
     <a:masterClrMapping/>
   </p:clrMapOvr>
+  <p:transition advClick="0" advTm="15000"/>
 </p:sldLayout>
 </file>
 
@@ -2218,6 +2224,7 @@
   <p:clrMapOvr>
     <a:masterClrMapping/>
   </p:clrMapOvr>
+  <p:transition advClick="0" advTm="15000"/>
 </p:sldLayout>
 </file>
 
@@ -2322,6 +2329,7 @@
   <p:clrMapOvr>
     <a:masterClrMapping/>
   </p:clrMapOvr>
+  <p:transition advClick="0" advTm="15000"/>
 </p:sldLayout>
 </file>
 
@@ -2580,6 +2588,7 @@
   <p:clrMapOvr>
     <a:masterClrMapping/>
   </p:clrMapOvr>
+  <p:transition advClick="0" advTm="15000"/>
 </p:sldLayout>
 </file>
 
@@ -2810,6 +2819,7 @@
   <p:clrMapOvr>
     <a:masterClrMapping/>
   </p:clrMapOvr>
+  <p:transition advClick="0" advTm="15000"/>
 </p:sldLayout>
 </file>
 
@@ -3101,6 +3111,7 @@
     <p:sldLayoutId id="2147483657" r:id="rId9"/>
     <p:sldLayoutId id="2147483658" r:id="rId10"/>
   </p:sldLayoutIdLst>
+  <p:transition advClick="0" advTm="15000"/>
   <p:hf hdr="0" dt="0"/>
   <p:txStyles>
     <p:titleStyle>
@@ -3477,11 +3488,38 @@
           </a:p>
         </p:txBody>
       </p:sp>
+      <p:sp>
+        <p:nvSpPr>
+          <p:cNvPr id="6" name="TextBox 5"/>
+          <p:cNvSpPr txBox="1"/>
+          <p:nvPr/>
+        </p:nvSpPr>
+        <p:spPr>
+          <a:xfrm>
+            <a:off x="1524000" y="4207565"/>
+            <a:ext cx="184666" cy="369332"/>
+          </a:xfrm>
+          <a:prstGeom prst="rect">
+            <a:avLst/>
+          </a:prstGeom>
+          <a:noFill/>
+        </p:spPr>
+        <p:txBody>
+          <a:bodyPr wrap="none" rtlCol="0">
+            <a:spAutoFit/>
+          </a:bodyPr>
+          <a:lstStyle/>
+          <a:p>
+            <a:endParaRPr lang="en-US" dirty="0"/>
+          </a:p>
+        </p:txBody>
+      </p:sp>
     </p:spTree>
   </p:cSld>
   <p:clrMapOvr>
     <a:masterClrMapping/>
   </p:clrMapOvr>
+  <p:transition advClick="0" advTm="15000"/>
   <p:timing>
     <p:tnLst>
       <p:par>
@@ -3631,6 +3669,7 @@
   <p:clrMapOvr>
     <a:masterClrMapping/>
   </p:clrMapOvr>
+  <p:transition advClick="0" advTm="15000"/>
   <p:timing>
     <p:tnLst>
       <p:par>
@@ -3770,6 +3809,7 @@
   <p:clrMapOvr>
     <a:masterClrMapping/>
   </p:clrMapOvr>
+  <p:transition advClick="0" advTm="15000"/>
   <p:timing>
     <p:tnLst>
       <p:par>
@@ -3992,6 +4032,7 @@
   <p:clrMapOvr>
     <a:masterClrMapping/>
   </p:clrMapOvr>
+  <p:transition advClick="0" advTm="15000"/>
   <p:timing>
     <p:tnLst>
       <p:par>
@@ -4113,6 +4154,7 @@
   <p:clrMapOvr>
     <a:masterClrMapping/>
   </p:clrMapOvr>
+  <p:transition advClick="0" advTm="15000"/>
   <p:timing>
     <p:tnLst>
       <p:par>
@@ -4262,6 +4304,7 @@
   <p:clrMapOvr>
     <a:masterClrMapping/>
   </p:clrMapOvr>
+  <p:transition advClick="0" advTm="15000"/>
   <p:timing>
     <p:tnLst>
       <p:par>
@@ -4337,21 +4380,13 @@
             </a:r>
             <a:r>
               <a:rPr lang="en-US" dirty="0" smtClean="0"/>
-              <a:t>  community</a:t>
-            </a:r>
-            <a:r>
-              <a:rPr lang="en-US" dirty="0" smtClean="0"/>
-              <a:t> </a:t>
-            </a:r>
-          </a:p>
-          <a:p>
-            <a:r>
-              <a:rPr lang="en-US" dirty="0" smtClean="0"/>
-              <a:t>Tools, tips, process, and </a:t>
-            </a:r>
-            <a:r>
-              <a:rPr lang="en-US" dirty="0" smtClean="0"/>
-              <a:t>culture</a:t>
+              <a:t>  community </a:t>
+            </a:r>
+          </a:p>
+          <a:p>
+            <a:r>
+              <a:rPr lang="en-US" dirty="0" smtClean="0"/>
+              <a:t>Tools, tips, process, and culture</a:t>
             </a:r>
           </a:p>
           <a:p>
@@ -4423,6 +4458,7 @@
   <p:clrMapOvr>
     <a:masterClrMapping/>
   </p:clrMapOvr>
+  <p:transition advClick="0" advTm="15000"/>
   <p:timing>
     <p:tnLst>
       <p:par>
@@ -4494,11 +4530,7 @@
             </a:r>
             <a:r>
               <a:rPr lang="en-US" dirty="0" smtClean="0"/>
-              <a:t> Examined</a:t>
-            </a:r>
-            <a:r>
-              <a:rPr lang="en-US" dirty="0" smtClean="0"/>
-              <a:t> </a:t>
+              <a:t> Examined </a:t>
             </a:r>
           </a:p>
           <a:p>
@@ -4518,11 +4550,7 @@
             </a:r>
             <a:r>
               <a:rPr lang="en-US" dirty="0" smtClean="0"/>
-              <a:t>-</a:t>
-            </a:r>
-            <a:r>
-              <a:rPr lang="en-US" dirty="0" smtClean="0"/>
-              <a:t>Hartman</a:t>
+              <a:t>-Hartman</a:t>
             </a:r>
           </a:p>
           <a:p>
@@ -4586,6 +4614,7 @@
   <p:clrMapOvr>
     <a:masterClrMapping/>
   </p:clrMapOvr>
+  <p:transition advClick="0" advTm="15000"/>
   <p:timing>
     <p:tnLst>
       <p:par>
@@ -4740,6 +4769,7 @@
   <p:clrMapOvr>
     <a:masterClrMapping/>
   </p:clrMapOvr>
+  <p:transition advClick="0" advTm="15000"/>
   <p:timing>
     <p:tnLst>
       <p:par>
@@ -4896,6 +4926,7 @@
   <p:clrMapOvr>
     <a:masterClrMapping/>
   </p:clrMapOvr>
+  <p:transition advClick="0" advTm="15000"/>
   <p:timing>
     <p:tnLst>
       <p:par>
@@ -5030,6 +5061,7 @@
   <p:clrMapOvr>
     <a:masterClrMapping/>
   </p:clrMapOvr>
+  <p:transition advClick="0" advTm="15000"/>
   <p:timing>
     <p:tnLst>
       <p:par>
@@ -5179,6 +5211,7 @@
   <p:clrMapOvr>
     <a:masterClrMapping/>
   </p:clrMapOvr>
+  <p:transition advClick="0" advTm="15000"/>
   <p:timing>
     <p:tnLst>
       <p:par>
@@ -5248,6 +5281,16 @@
               <a:rPr lang="en-US" dirty="0" smtClean="0"/>
               <a:t>Be sure to listen to the Food Fight Show!</a:t>
             </a:r>
+          </a:p>
+          <a:p>
+            <a:r>
+              <a:rPr lang="en-US" dirty="0" smtClean="0"/>
+              <a:t>http://</a:t>
+            </a:r>
+            <a:r>
+              <a:rPr lang="en-US" dirty="0" err="1" smtClean="0"/>
+              <a:t>foodfightshow.org</a:t>
+            </a:r>
             <a:endParaRPr lang="en-US" dirty="0"/>
           </a:p>
         </p:txBody>
@@ -5315,7 +5358,7 @@
         </p:blipFill>
         <p:spPr>
           <a:xfrm>
-            <a:off x="914400" y="2506593"/>
+            <a:off x="914400" y="2793711"/>
             <a:ext cx="7315200" cy="2882900"/>
           </a:xfrm>
           <a:prstGeom prst="rect">
@@ -5328,6 +5371,7 @@
   <p:clrMapOvr>
     <a:masterClrMapping/>
   </p:clrMapOvr>
+  <p:transition advClick="0" advTm="15000"/>
   <p:timing>
     <p:tnLst>
       <p:par>
@@ -5471,6 +5515,7 @@
   <p:clrMapOvr>
     <a:masterClrMapping/>
   </p:clrMapOvr>
+  <p:transition advClick="0" advTm="15000"/>
   <p:timing>
     <p:tnLst>
       <p:par>
@@ -5642,6 +5687,7 @@
   <p:clrMapOvr>
     <a:masterClrMapping/>
   </p:clrMapOvr>
+  <p:transition advClick="0" advTm="15000"/>
   <p:timing>
     <p:tnLst>
       <p:par>
@@ -5822,6 +5868,7 @@
   <p:clrMapOvr>
     <a:masterClrMapping/>
   </p:clrMapOvr>
+  <p:transition advClick="0" advTm="15000"/>
   <p:timing>
     <p:tnLst>
       <p:par>
@@ -5986,6 +6033,7 @@
   <p:clrMapOvr>
     <a:masterClrMapping/>
   </p:clrMapOvr>
+  <p:transition advClick="0" advTm="15000"/>
   <p:timing>
     <p:tnLst>
       <p:par>
@@ -6135,6 +6183,7 @@
   <p:clrMapOvr>
     <a:masterClrMapping/>
   </p:clrMapOvr>
+  <p:transition advClick="0" advTm="15000"/>
   <p:timing>
     <p:tnLst>
       <p:par>
@@ -6261,6 +6310,7 @@
   <p:clrMapOvr>
     <a:masterClrMapping/>
   </p:clrMapOvr>
+  <p:transition advClick="0" advTm="15000"/>
   <p:timing>
     <p:tnLst>
       <p:par>
@@ -6387,6 +6437,7 @@
   <p:clrMapOvr>
     <a:masterClrMapping/>
   </p:clrMapOvr>
+  <p:transition advClick="0" advTm="15000"/>
   <p:timing>
     <p:tnLst>
       <p:par>

</xml_diff>